<commit_message>
Funcion Sparameters para distribuidos, y fnciones no usadas eliminadas
</commit_message>
<xml_diff>
--- a/Test circuits/PruebasElementosDistribuidos.pptx
+++ b/Test circuits/PruebasElementosDistribuidos.pptx
@@ -272,7 +272,7 @@
           <a:p>
             <a:fld id="{52DE271A-D5F4-49C3-80C7-290EA8845C5F}" type="datetimeFigureOut">
               <a:rPr lang="es-MX" smtClean="0"/>
-              <a:t>25/11/2023</a:t>
+              <a:t>26/11/2023</a:t>
             </a:fld>
             <a:endParaRPr lang="es-MX"/>
           </a:p>
@@ -472,7 +472,7 @@
           <a:p>
             <a:fld id="{52DE271A-D5F4-49C3-80C7-290EA8845C5F}" type="datetimeFigureOut">
               <a:rPr lang="es-MX" smtClean="0"/>
-              <a:t>25/11/2023</a:t>
+              <a:t>26/11/2023</a:t>
             </a:fld>
             <a:endParaRPr lang="es-MX"/>
           </a:p>
@@ -682,7 +682,7 @@
           <a:p>
             <a:fld id="{52DE271A-D5F4-49C3-80C7-290EA8845C5F}" type="datetimeFigureOut">
               <a:rPr lang="es-MX" smtClean="0"/>
-              <a:t>25/11/2023</a:t>
+              <a:t>26/11/2023</a:t>
             </a:fld>
             <a:endParaRPr lang="es-MX"/>
           </a:p>
@@ -882,7 +882,7 @@
           <a:p>
             <a:fld id="{52DE271A-D5F4-49C3-80C7-290EA8845C5F}" type="datetimeFigureOut">
               <a:rPr lang="es-MX" smtClean="0"/>
-              <a:t>25/11/2023</a:t>
+              <a:t>26/11/2023</a:t>
             </a:fld>
             <a:endParaRPr lang="es-MX"/>
           </a:p>
@@ -1158,7 +1158,7 @@
           <a:p>
             <a:fld id="{52DE271A-D5F4-49C3-80C7-290EA8845C5F}" type="datetimeFigureOut">
               <a:rPr lang="es-MX" smtClean="0"/>
-              <a:t>25/11/2023</a:t>
+              <a:t>26/11/2023</a:t>
             </a:fld>
             <a:endParaRPr lang="es-MX"/>
           </a:p>
@@ -1426,7 +1426,7 @@
           <a:p>
             <a:fld id="{52DE271A-D5F4-49C3-80C7-290EA8845C5F}" type="datetimeFigureOut">
               <a:rPr lang="es-MX" smtClean="0"/>
-              <a:t>25/11/2023</a:t>
+              <a:t>26/11/2023</a:t>
             </a:fld>
             <a:endParaRPr lang="es-MX"/>
           </a:p>
@@ -1841,7 +1841,7 @@
           <a:p>
             <a:fld id="{52DE271A-D5F4-49C3-80C7-290EA8845C5F}" type="datetimeFigureOut">
               <a:rPr lang="es-MX" smtClean="0"/>
-              <a:t>25/11/2023</a:t>
+              <a:t>26/11/2023</a:t>
             </a:fld>
             <a:endParaRPr lang="es-MX"/>
           </a:p>
@@ -1983,7 +1983,7 @@
           <a:p>
             <a:fld id="{52DE271A-D5F4-49C3-80C7-290EA8845C5F}" type="datetimeFigureOut">
               <a:rPr lang="es-MX" smtClean="0"/>
-              <a:t>25/11/2023</a:t>
+              <a:t>26/11/2023</a:t>
             </a:fld>
             <a:endParaRPr lang="es-MX"/>
           </a:p>
@@ -2096,7 +2096,7 @@
           <a:p>
             <a:fld id="{52DE271A-D5F4-49C3-80C7-290EA8845C5F}" type="datetimeFigureOut">
               <a:rPr lang="es-MX" smtClean="0"/>
-              <a:t>25/11/2023</a:t>
+              <a:t>26/11/2023</a:t>
             </a:fld>
             <a:endParaRPr lang="es-MX"/>
           </a:p>
@@ -2409,7 +2409,7 @@
           <a:p>
             <a:fld id="{52DE271A-D5F4-49C3-80C7-290EA8845C5F}" type="datetimeFigureOut">
               <a:rPr lang="es-MX" smtClean="0"/>
-              <a:t>25/11/2023</a:t>
+              <a:t>26/11/2023</a:t>
             </a:fld>
             <a:endParaRPr lang="es-MX"/>
           </a:p>
@@ -2698,7 +2698,7 @@
           <a:p>
             <a:fld id="{52DE271A-D5F4-49C3-80C7-290EA8845C5F}" type="datetimeFigureOut">
               <a:rPr lang="es-MX" smtClean="0"/>
-              <a:t>25/11/2023</a:t>
+              <a:t>26/11/2023</a:t>
             </a:fld>
             <a:endParaRPr lang="es-MX"/>
           </a:p>
@@ -2941,7 +2941,7 @@
           <a:p>
             <a:fld id="{52DE271A-D5F4-49C3-80C7-290EA8845C5F}" type="datetimeFigureOut">
               <a:rPr lang="es-MX" smtClean="0"/>
-              <a:t>25/11/2023</a:t>
+              <a:t>26/11/2023</a:t>
             </a:fld>
             <a:endParaRPr lang="es-MX"/>
           </a:p>
@@ -3859,8 +3859,8 @@
         </p:blipFill>
         <p:spPr>
           <a:xfrm>
-            <a:off x="399556" y="1478111"/>
-            <a:ext cx="11392887" cy="3901778"/>
+            <a:off x="3012128" y="341486"/>
+            <a:ext cx="7027611" cy="2406780"/>
           </a:xfrm>
           <a:prstGeom prst="rect">
             <a:avLst/>
@@ -3883,14 +3883,14 @@
             <p:ph idx="1"/>
             <p:extLst>
               <p:ext uri="{D42A27DB-BD31-4B8C-83A1-F6EECF244321}">
-                <p14:modId xmlns:p14="http://schemas.microsoft.com/office/powerpoint/2010/main" val="2877022592"/>
+                <p14:modId xmlns:p14="http://schemas.microsoft.com/office/powerpoint/2010/main" val="1604236709"/>
               </p:ext>
             </p:extLst>
           </p:nvPr>
         </p:nvGraphicFramePr>
         <p:xfrm>
-          <a:off x="838200" y="2844800"/>
-          <a:ext cx="10515600" cy="2312988"/>
+          <a:off x="7920135" y="5508431"/>
+          <a:ext cx="3652833" cy="803469"/>
         </p:xfrm>
         <a:graphic>
           <a:graphicData uri="http://schemas.openxmlformats.org/presentationml/2006/ole">
@@ -3917,8 +3917,8 @@
                     </p:blipFill>
                     <p:spPr>
                       <a:xfrm>
-                        <a:off x="838200" y="2844800"/>
-                        <a:ext cx="10515600" cy="2312988"/>
+                        <a:off x="7920135" y="5508431"/>
+                        <a:ext cx="3652833" cy="803469"/>
                       </a:xfrm>
                       <a:prstGeom prst="rect">
                         <a:avLst/>

</xml_diff>

<commit_message>
Funciones ABCD para distribuidos, avance en funcion GetNets
</commit_message>
<xml_diff>
--- a/Test circuits/PruebasElementosDistribuidos.pptx
+++ b/Test circuits/PruebasElementosDistribuidos.pptx
@@ -272,7 +272,7 @@
           <a:p>
             <a:fld id="{52DE271A-D5F4-49C3-80C7-290EA8845C5F}" type="datetimeFigureOut">
               <a:rPr lang="es-MX" smtClean="0"/>
-              <a:t>26/11/2023</a:t>
+              <a:t>27/11/2023</a:t>
             </a:fld>
             <a:endParaRPr lang="es-MX"/>
           </a:p>
@@ -472,7 +472,7 @@
           <a:p>
             <a:fld id="{52DE271A-D5F4-49C3-80C7-290EA8845C5F}" type="datetimeFigureOut">
               <a:rPr lang="es-MX" smtClean="0"/>
-              <a:t>26/11/2023</a:t>
+              <a:t>27/11/2023</a:t>
             </a:fld>
             <a:endParaRPr lang="es-MX"/>
           </a:p>
@@ -682,7 +682,7 @@
           <a:p>
             <a:fld id="{52DE271A-D5F4-49C3-80C7-290EA8845C5F}" type="datetimeFigureOut">
               <a:rPr lang="es-MX" smtClean="0"/>
-              <a:t>26/11/2023</a:t>
+              <a:t>27/11/2023</a:t>
             </a:fld>
             <a:endParaRPr lang="es-MX"/>
           </a:p>
@@ -882,7 +882,7 @@
           <a:p>
             <a:fld id="{52DE271A-D5F4-49C3-80C7-290EA8845C5F}" type="datetimeFigureOut">
               <a:rPr lang="es-MX" smtClean="0"/>
-              <a:t>26/11/2023</a:t>
+              <a:t>27/11/2023</a:t>
             </a:fld>
             <a:endParaRPr lang="es-MX"/>
           </a:p>
@@ -1158,7 +1158,7 @@
           <a:p>
             <a:fld id="{52DE271A-D5F4-49C3-80C7-290EA8845C5F}" type="datetimeFigureOut">
               <a:rPr lang="es-MX" smtClean="0"/>
-              <a:t>26/11/2023</a:t>
+              <a:t>27/11/2023</a:t>
             </a:fld>
             <a:endParaRPr lang="es-MX"/>
           </a:p>
@@ -1426,7 +1426,7 @@
           <a:p>
             <a:fld id="{52DE271A-D5F4-49C3-80C7-290EA8845C5F}" type="datetimeFigureOut">
               <a:rPr lang="es-MX" smtClean="0"/>
-              <a:t>26/11/2023</a:t>
+              <a:t>27/11/2023</a:t>
             </a:fld>
             <a:endParaRPr lang="es-MX"/>
           </a:p>
@@ -1841,7 +1841,7 @@
           <a:p>
             <a:fld id="{52DE271A-D5F4-49C3-80C7-290EA8845C5F}" type="datetimeFigureOut">
               <a:rPr lang="es-MX" smtClean="0"/>
-              <a:t>26/11/2023</a:t>
+              <a:t>27/11/2023</a:t>
             </a:fld>
             <a:endParaRPr lang="es-MX"/>
           </a:p>
@@ -1983,7 +1983,7 @@
           <a:p>
             <a:fld id="{52DE271A-D5F4-49C3-80C7-290EA8845C5F}" type="datetimeFigureOut">
               <a:rPr lang="es-MX" smtClean="0"/>
-              <a:t>26/11/2023</a:t>
+              <a:t>27/11/2023</a:t>
             </a:fld>
             <a:endParaRPr lang="es-MX"/>
           </a:p>
@@ -2096,7 +2096,7 @@
           <a:p>
             <a:fld id="{52DE271A-D5F4-49C3-80C7-290EA8845C5F}" type="datetimeFigureOut">
               <a:rPr lang="es-MX" smtClean="0"/>
-              <a:t>26/11/2023</a:t>
+              <a:t>27/11/2023</a:t>
             </a:fld>
             <a:endParaRPr lang="es-MX"/>
           </a:p>
@@ -2409,7 +2409,7 @@
           <a:p>
             <a:fld id="{52DE271A-D5F4-49C3-80C7-290EA8845C5F}" type="datetimeFigureOut">
               <a:rPr lang="es-MX" smtClean="0"/>
-              <a:t>26/11/2023</a:t>
+              <a:t>27/11/2023</a:t>
             </a:fld>
             <a:endParaRPr lang="es-MX"/>
           </a:p>
@@ -2698,7 +2698,7 @@
           <a:p>
             <a:fld id="{52DE271A-D5F4-49C3-80C7-290EA8845C5F}" type="datetimeFigureOut">
               <a:rPr lang="es-MX" smtClean="0"/>
-              <a:t>26/11/2023</a:t>
+              <a:t>27/11/2023</a:t>
             </a:fld>
             <a:endParaRPr lang="es-MX"/>
           </a:p>
@@ -2941,7 +2941,7 @@
           <a:p>
             <a:fld id="{52DE271A-D5F4-49C3-80C7-290EA8845C5F}" type="datetimeFigureOut">
               <a:rPr lang="es-MX" smtClean="0"/>
-              <a:t>26/11/2023</a:t>
+              <a:t>27/11/2023</a:t>
             </a:fld>
             <a:endParaRPr lang="es-MX"/>
           </a:p>
@@ -3859,8 +3859,8 @@
         </p:blipFill>
         <p:spPr>
           <a:xfrm>
-            <a:off x="3012128" y="341486"/>
-            <a:ext cx="7027611" cy="2406780"/>
+            <a:off x="180405" y="903216"/>
+            <a:ext cx="10453106" cy="3579926"/>
           </a:xfrm>
           <a:prstGeom prst="rect">
             <a:avLst/>
@@ -3983,7 +3983,7 @@
         </p:blipFill>
         <p:spPr>
           <a:xfrm>
-            <a:off x="184441" y="369109"/>
+            <a:off x="184441" y="376036"/>
             <a:ext cx="6235410" cy="2604061"/>
           </a:xfrm>
           <a:prstGeom prst="rect">
@@ -4036,13 +4036,13 @@
           <p:nvPr>
             <p:extLst>
               <p:ext uri="{D42A27DB-BD31-4B8C-83A1-F6EECF244321}">
-                <p14:modId xmlns:p14="http://schemas.microsoft.com/office/powerpoint/2010/main" val="1529923631"/>
+                <p14:modId xmlns:p14="http://schemas.microsoft.com/office/powerpoint/2010/main" val="2930562056"/>
               </p:ext>
             </p:extLst>
           </p:nvPr>
         </p:nvGraphicFramePr>
         <p:xfrm>
-          <a:off x="6936047" y="1956271"/>
+          <a:off x="6936047" y="1965602"/>
           <a:ext cx="4518757" cy="880235"/>
         </p:xfrm>
         <a:graphic>
@@ -4070,7 +4070,7 @@
                     </p:blipFill>
                     <p:spPr>
                       <a:xfrm>
-                        <a:off x="6936047" y="1956271"/>
+                        <a:off x="6936047" y="1965602"/>
                         <a:ext cx="4518757" cy="880235"/>
                       </a:xfrm>
                       <a:prstGeom prst="rect">
@@ -4640,7 +4640,7 @@
           <p:nvPr>
             <p:extLst>
               <p:ext uri="{D42A27DB-BD31-4B8C-83A1-F6EECF244321}">
-                <p14:modId xmlns:p14="http://schemas.microsoft.com/office/powerpoint/2010/main" val="430440531"/>
+                <p14:modId xmlns:p14="http://schemas.microsoft.com/office/powerpoint/2010/main" val="2137212664"/>
               </p:ext>
             </p:extLst>
           </p:nvPr>

</xml_diff>

<commit_message>
Avances de metodo circuito equivalente
</commit_message>
<xml_diff>
--- a/Test circuits/PruebasElementosDistribuidos.pptx
+++ b/Test circuits/PruebasElementosDistribuidos.pptx
@@ -17,6 +17,7 @@
     <p:sldId id="263" r:id="rId11"/>
     <p:sldId id="264" r:id="rId12"/>
     <p:sldId id="265" r:id="rId13"/>
+    <p:sldId id="268" r:id="rId14"/>
   </p:sldIdLst>
   <p:sldSz cx="12192000" cy="6858000"/>
   <p:notesSz cx="6858000" cy="9144000"/>
@@ -272,7 +273,7 @@
           <a:p>
             <a:fld id="{52DE271A-D5F4-49C3-80C7-290EA8845C5F}" type="datetimeFigureOut">
               <a:rPr lang="es-MX" smtClean="0"/>
-              <a:t>27/11/2023</a:t>
+              <a:t>04/12/2023</a:t>
             </a:fld>
             <a:endParaRPr lang="es-MX"/>
           </a:p>
@@ -472,7 +473,7 @@
           <a:p>
             <a:fld id="{52DE271A-D5F4-49C3-80C7-290EA8845C5F}" type="datetimeFigureOut">
               <a:rPr lang="es-MX" smtClean="0"/>
-              <a:t>27/11/2023</a:t>
+              <a:t>04/12/2023</a:t>
             </a:fld>
             <a:endParaRPr lang="es-MX"/>
           </a:p>
@@ -682,7 +683,7 @@
           <a:p>
             <a:fld id="{52DE271A-D5F4-49C3-80C7-290EA8845C5F}" type="datetimeFigureOut">
               <a:rPr lang="es-MX" smtClean="0"/>
-              <a:t>27/11/2023</a:t>
+              <a:t>04/12/2023</a:t>
             </a:fld>
             <a:endParaRPr lang="es-MX"/>
           </a:p>
@@ -882,7 +883,7 @@
           <a:p>
             <a:fld id="{52DE271A-D5F4-49C3-80C7-290EA8845C5F}" type="datetimeFigureOut">
               <a:rPr lang="es-MX" smtClean="0"/>
-              <a:t>27/11/2023</a:t>
+              <a:t>04/12/2023</a:t>
             </a:fld>
             <a:endParaRPr lang="es-MX"/>
           </a:p>
@@ -1158,7 +1159,7 @@
           <a:p>
             <a:fld id="{52DE271A-D5F4-49C3-80C7-290EA8845C5F}" type="datetimeFigureOut">
               <a:rPr lang="es-MX" smtClean="0"/>
-              <a:t>27/11/2023</a:t>
+              <a:t>04/12/2023</a:t>
             </a:fld>
             <a:endParaRPr lang="es-MX"/>
           </a:p>
@@ -1426,7 +1427,7 @@
           <a:p>
             <a:fld id="{52DE271A-D5F4-49C3-80C7-290EA8845C5F}" type="datetimeFigureOut">
               <a:rPr lang="es-MX" smtClean="0"/>
-              <a:t>27/11/2023</a:t>
+              <a:t>04/12/2023</a:t>
             </a:fld>
             <a:endParaRPr lang="es-MX"/>
           </a:p>
@@ -1841,7 +1842,7 @@
           <a:p>
             <a:fld id="{52DE271A-D5F4-49C3-80C7-290EA8845C5F}" type="datetimeFigureOut">
               <a:rPr lang="es-MX" smtClean="0"/>
-              <a:t>27/11/2023</a:t>
+              <a:t>04/12/2023</a:t>
             </a:fld>
             <a:endParaRPr lang="es-MX"/>
           </a:p>
@@ -1983,7 +1984,7 @@
           <a:p>
             <a:fld id="{52DE271A-D5F4-49C3-80C7-290EA8845C5F}" type="datetimeFigureOut">
               <a:rPr lang="es-MX" smtClean="0"/>
-              <a:t>27/11/2023</a:t>
+              <a:t>04/12/2023</a:t>
             </a:fld>
             <a:endParaRPr lang="es-MX"/>
           </a:p>
@@ -2096,7 +2097,7 @@
           <a:p>
             <a:fld id="{52DE271A-D5F4-49C3-80C7-290EA8845C5F}" type="datetimeFigureOut">
               <a:rPr lang="es-MX" smtClean="0"/>
-              <a:t>27/11/2023</a:t>
+              <a:t>04/12/2023</a:t>
             </a:fld>
             <a:endParaRPr lang="es-MX"/>
           </a:p>
@@ -2409,7 +2410,7 @@
           <a:p>
             <a:fld id="{52DE271A-D5F4-49C3-80C7-290EA8845C5F}" type="datetimeFigureOut">
               <a:rPr lang="es-MX" smtClean="0"/>
-              <a:t>27/11/2023</a:t>
+              <a:t>04/12/2023</a:t>
             </a:fld>
             <a:endParaRPr lang="es-MX"/>
           </a:p>
@@ -2698,7 +2699,7 @@
           <a:p>
             <a:fld id="{52DE271A-D5F4-49C3-80C7-290EA8845C5F}" type="datetimeFigureOut">
               <a:rPr lang="es-MX" smtClean="0"/>
-              <a:t>27/11/2023</a:t>
+              <a:t>04/12/2023</a:t>
             </a:fld>
             <a:endParaRPr lang="es-MX"/>
           </a:p>
@@ -2941,7 +2942,7 @@
           <a:p>
             <a:fld id="{52DE271A-D5F4-49C3-80C7-290EA8845C5F}" type="datetimeFigureOut">
               <a:rPr lang="es-MX" smtClean="0"/>
-              <a:t>27/11/2023</a:t>
+              <a:t>04/12/2023</a:t>
             </a:fld>
             <a:endParaRPr lang="es-MX"/>
           </a:p>
@@ -3935,6 +3936,146 @@
     <p:extLst>
       <p:ext uri="{BB962C8B-B14F-4D97-AF65-F5344CB8AC3E}">
         <p14:creationId xmlns:p14="http://schemas.microsoft.com/office/powerpoint/2010/main" val="962476512"/>
+      </p:ext>
+    </p:extLst>
+  </p:cSld>
+  <p:clrMapOvr>
+    <a:masterClrMapping/>
+  </p:clrMapOvr>
+</p:sld>
+</file>
+
+<file path=ppt/slides/slide13.xml><?xml version="1.0" encoding="utf-8"?>
+<p:sld xmlns:a="http://schemas.openxmlformats.org/drawingml/2006/main" xmlns:r="http://schemas.openxmlformats.org/officeDocument/2006/relationships" xmlns:p="http://schemas.openxmlformats.org/presentationml/2006/main">
+  <p:cSld>
+    <p:spTree>
+      <p:nvGrpSpPr>
+        <p:cNvPr id="1" name=""/>
+        <p:cNvGrpSpPr/>
+        <p:nvPr/>
+      </p:nvGrpSpPr>
+      <p:grpSpPr>
+        <a:xfrm>
+          <a:off x="0" y="0"/>
+          <a:ext cx="0" cy="0"/>
+          <a:chOff x="0" y="0"/>
+          <a:chExt cx="0" cy="0"/>
+        </a:xfrm>
+      </p:grpSpPr>
+      <p:sp>
+        <p:nvSpPr>
+          <p:cNvPr id="2" name="Title 1">
+            <a:extLst>
+              <a:ext uri="{FF2B5EF4-FFF2-40B4-BE49-F238E27FC236}">
+                <a16:creationId xmlns:a16="http://schemas.microsoft.com/office/drawing/2014/main" id="{59904D48-968A-2BAF-2B51-4323FB58CA44}"/>
+              </a:ext>
+            </a:extLst>
+          </p:cNvPr>
+          <p:cNvSpPr>
+            <a:spLocks noGrp="1"/>
+          </p:cNvSpPr>
+          <p:nvPr>
+            <p:ph type="title"/>
+          </p:nvPr>
+        </p:nvSpPr>
+        <p:spPr/>
+        <p:txBody>
+          <a:bodyPr/>
+          <a:lstStyle/>
+          <a:p>
+            <a:endParaRPr lang="es-MX"/>
+          </a:p>
+        </p:txBody>
+      </p:sp>
+      <p:sp>
+        <p:nvSpPr>
+          <p:cNvPr id="3" name="Content Placeholder 2">
+            <a:extLst>
+              <a:ext uri="{FF2B5EF4-FFF2-40B4-BE49-F238E27FC236}">
+                <a16:creationId xmlns:a16="http://schemas.microsoft.com/office/drawing/2014/main" id="{BFDFA112-1DF2-8FF2-1E63-836186F23AF3}"/>
+              </a:ext>
+            </a:extLst>
+          </p:cNvPr>
+          <p:cNvSpPr>
+            <a:spLocks noGrp="1"/>
+          </p:cNvSpPr>
+          <p:nvPr>
+            <p:ph idx="1"/>
+          </p:nvPr>
+        </p:nvSpPr>
+        <p:spPr/>
+        <p:txBody>
+          <a:bodyPr/>
+          <a:lstStyle/>
+          <a:p>
+            <a:endParaRPr lang="es-MX"/>
+          </a:p>
+        </p:txBody>
+      </p:sp>
+      <p:pic>
+        <p:nvPicPr>
+          <p:cNvPr id="5" name="Picture 4">
+            <a:extLst>
+              <a:ext uri="{FF2B5EF4-FFF2-40B4-BE49-F238E27FC236}">
+                <a16:creationId xmlns:a16="http://schemas.microsoft.com/office/drawing/2014/main" id="{882172C3-1566-260C-76A4-0E0751D79519}"/>
+              </a:ext>
+            </a:extLst>
+          </p:cNvPr>
+          <p:cNvPicPr>
+            <a:picLocks noChangeAspect="1"/>
+          </p:cNvPicPr>
+          <p:nvPr/>
+        </p:nvPicPr>
+        <p:blipFill>
+          <a:blip r:embed="rId2"/>
+          <a:stretch>
+            <a:fillRect/>
+          </a:stretch>
+        </p:blipFill>
+        <p:spPr>
+          <a:xfrm>
+            <a:off x="398873" y="2491108"/>
+            <a:ext cx="6328376" cy="4001767"/>
+          </a:xfrm>
+          <a:prstGeom prst="rect">
+            <a:avLst/>
+          </a:prstGeom>
+        </p:spPr>
+      </p:pic>
+      <p:pic>
+        <p:nvPicPr>
+          <p:cNvPr id="7" name="Picture 6">
+            <a:extLst>
+              <a:ext uri="{FF2B5EF4-FFF2-40B4-BE49-F238E27FC236}">
+                <a16:creationId xmlns:a16="http://schemas.microsoft.com/office/drawing/2014/main" id="{68759C6C-7C76-E83D-49BB-C98FA8F6C84C}"/>
+              </a:ext>
+            </a:extLst>
+          </p:cNvPr>
+          <p:cNvPicPr>
+            <a:picLocks noChangeAspect="1"/>
+          </p:cNvPicPr>
+          <p:nvPr/>
+        </p:nvPicPr>
+        <p:blipFill>
+          <a:blip r:embed="rId3"/>
+          <a:stretch>
+            <a:fillRect/>
+          </a:stretch>
+        </p:blipFill>
+        <p:spPr>
+          <a:xfrm>
+            <a:off x="348235" y="154170"/>
+            <a:ext cx="6379014" cy="2255655"/>
+          </a:xfrm>
+          <a:prstGeom prst="rect">
+            <a:avLst/>
+          </a:prstGeom>
+        </p:spPr>
+      </p:pic>
+    </p:spTree>
+    <p:extLst>
+      <p:ext uri="{BB962C8B-B14F-4D97-AF65-F5344CB8AC3E}">
+        <p14:creationId xmlns:p14="http://schemas.microsoft.com/office/powerpoint/2010/main" val="1345588621"/>
       </p:ext>
     </p:extLst>
   </p:cSld>

</xml_diff>

<commit_message>
Circuitos de prueba y modificación para elementos en serie
</commit_message>
<xml_diff>
--- a/Test circuits/PruebasElementosDistribuidos.pptx
+++ b/Test circuits/PruebasElementosDistribuidos.pptx
@@ -5,19 +5,20 @@
     <p:sldMasterId id="2147483648" r:id="rId1"/>
   </p:sldMasterIdLst>
   <p:sldIdLst>
-    <p:sldId id="266" r:id="rId2"/>
-    <p:sldId id="256" r:id="rId3"/>
-    <p:sldId id="257" r:id="rId4"/>
-    <p:sldId id="258" r:id="rId5"/>
-    <p:sldId id="261" r:id="rId6"/>
-    <p:sldId id="259" r:id="rId7"/>
-    <p:sldId id="260" r:id="rId8"/>
-    <p:sldId id="267" r:id="rId9"/>
-    <p:sldId id="262" r:id="rId10"/>
-    <p:sldId id="263" r:id="rId11"/>
-    <p:sldId id="264" r:id="rId12"/>
-    <p:sldId id="265" r:id="rId13"/>
-    <p:sldId id="268" r:id="rId14"/>
+    <p:sldId id="269" r:id="rId2"/>
+    <p:sldId id="266" r:id="rId3"/>
+    <p:sldId id="256" r:id="rId4"/>
+    <p:sldId id="257" r:id="rId5"/>
+    <p:sldId id="258" r:id="rId6"/>
+    <p:sldId id="261" r:id="rId7"/>
+    <p:sldId id="259" r:id="rId8"/>
+    <p:sldId id="260" r:id="rId9"/>
+    <p:sldId id="267" r:id="rId10"/>
+    <p:sldId id="262" r:id="rId11"/>
+    <p:sldId id="263" r:id="rId12"/>
+    <p:sldId id="264" r:id="rId13"/>
+    <p:sldId id="265" r:id="rId14"/>
+    <p:sldId id="268" r:id="rId15"/>
   </p:sldIdLst>
   <p:sldSz cx="12192000" cy="6858000"/>
   <p:notesSz cx="6858000" cy="9144000"/>
@@ -273,7 +274,7 @@
           <a:p>
             <a:fld id="{52DE271A-D5F4-49C3-80C7-290EA8845C5F}" type="datetimeFigureOut">
               <a:rPr lang="es-MX" smtClean="0"/>
-              <a:t>04/12/2023</a:t>
+              <a:t>12/12/2023</a:t>
             </a:fld>
             <a:endParaRPr lang="es-MX"/>
           </a:p>
@@ -473,7 +474,7 @@
           <a:p>
             <a:fld id="{52DE271A-D5F4-49C3-80C7-290EA8845C5F}" type="datetimeFigureOut">
               <a:rPr lang="es-MX" smtClean="0"/>
-              <a:t>04/12/2023</a:t>
+              <a:t>12/12/2023</a:t>
             </a:fld>
             <a:endParaRPr lang="es-MX"/>
           </a:p>
@@ -683,7 +684,7 @@
           <a:p>
             <a:fld id="{52DE271A-D5F4-49C3-80C7-290EA8845C5F}" type="datetimeFigureOut">
               <a:rPr lang="es-MX" smtClean="0"/>
-              <a:t>04/12/2023</a:t>
+              <a:t>12/12/2023</a:t>
             </a:fld>
             <a:endParaRPr lang="es-MX"/>
           </a:p>
@@ -883,7 +884,7 @@
           <a:p>
             <a:fld id="{52DE271A-D5F4-49C3-80C7-290EA8845C5F}" type="datetimeFigureOut">
               <a:rPr lang="es-MX" smtClean="0"/>
-              <a:t>04/12/2023</a:t>
+              <a:t>12/12/2023</a:t>
             </a:fld>
             <a:endParaRPr lang="es-MX"/>
           </a:p>
@@ -1159,7 +1160,7 @@
           <a:p>
             <a:fld id="{52DE271A-D5F4-49C3-80C7-290EA8845C5F}" type="datetimeFigureOut">
               <a:rPr lang="es-MX" smtClean="0"/>
-              <a:t>04/12/2023</a:t>
+              <a:t>12/12/2023</a:t>
             </a:fld>
             <a:endParaRPr lang="es-MX"/>
           </a:p>
@@ -1427,7 +1428,7 @@
           <a:p>
             <a:fld id="{52DE271A-D5F4-49C3-80C7-290EA8845C5F}" type="datetimeFigureOut">
               <a:rPr lang="es-MX" smtClean="0"/>
-              <a:t>04/12/2023</a:t>
+              <a:t>12/12/2023</a:t>
             </a:fld>
             <a:endParaRPr lang="es-MX"/>
           </a:p>
@@ -1842,7 +1843,7 @@
           <a:p>
             <a:fld id="{52DE271A-D5F4-49C3-80C7-290EA8845C5F}" type="datetimeFigureOut">
               <a:rPr lang="es-MX" smtClean="0"/>
-              <a:t>04/12/2023</a:t>
+              <a:t>12/12/2023</a:t>
             </a:fld>
             <a:endParaRPr lang="es-MX"/>
           </a:p>
@@ -1984,7 +1985,7 @@
           <a:p>
             <a:fld id="{52DE271A-D5F4-49C3-80C7-290EA8845C5F}" type="datetimeFigureOut">
               <a:rPr lang="es-MX" smtClean="0"/>
-              <a:t>04/12/2023</a:t>
+              <a:t>12/12/2023</a:t>
             </a:fld>
             <a:endParaRPr lang="es-MX"/>
           </a:p>
@@ -2097,7 +2098,7 @@
           <a:p>
             <a:fld id="{52DE271A-D5F4-49C3-80C7-290EA8845C5F}" type="datetimeFigureOut">
               <a:rPr lang="es-MX" smtClean="0"/>
-              <a:t>04/12/2023</a:t>
+              <a:t>12/12/2023</a:t>
             </a:fld>
             <a:endParaRPr lang="es-MX"/>
           </a:p>
@@ -2410,7 +2411,7 @@
           <a:p>
             <a:fld id="{52DE271A-D5F4-49C3-80C7-290EA8845C5F}" type="datetimeFigureOut">
               <a:rPr lang="es-MX" smtClean="0"/>
-              <a:t>04/12/2023</a:t>
+              <a:t>12/12/2023</a:t>
             </a:fld>
             <a:endParaRPr lang="es-MX"/>
           </a:p>
@@ -2699,7 +2700,7 @@
           <a:p>
             <a:fld id="{52DE271A-D5F4-49C3-80C7-290EA8845C5F}" type="datetimeFigureOut">
               <a:rPr lang="es-MX" smtClean="0"/>
-              <a:t>04/12/2023</a:t>
+              <a:t>12/12/2023</a:t>
             </a:fld>
             <a:endParaRPr lang="es-MX"/>
           </a:p>
@@ -2942,7 +2943,7 @@
           <a:p>
             <a:fld id="{52DE271A-D5F4-49C3-80C7-290EA8845C5F}" type="datetimeFigureOut">
               <a:rPr lang="es-MX" smtClean="0"/>
-              <a:t>04/12/2023</a:t>
+              <a:t>12/12/2023</a:t>
             </a:fld>
             <a:endParaRPr lang="es-MX"/>
           </a:p>
@@ -3364,7 +3365,7 @@
           <p:cNvPr id="2" name="Title 1">
             <a:extLst>
               <a:ext uri="{FF2B5EF4-FFF2-40B4-BE49-F238E27FC236}">
-                <a16:creationId xmlns:a16="http://schemas.microsoft.com/office/drawing/2014/main" id="{19D7FB23-EDF7-D84B-97F8-0E6D5706DC2F}"/>
+                <a16:creationId xmlns:a16="http://schemas.microsoft.com/office/drawing/2014/main" id="{523FB664-5A7D-C7DC-5D6B-10CDCF2B28B8}"/>
               </a:ext>
             </a:extLst>
           </p:cNvPr>
@@ -3375,12 +3376,32 @@
             <p:ph type="title"/>
           </p:nvPr>
         </p:nvSpPr>
-        <p:spPr>
-          <a:xfrm>
-            <a:off x="3777343" y="2371207"/>
-            <a:ext cx="10515600" cy="1325563"/>
-          </a:xfrm>
-        </p:spPr>
+        <p:spPr/>
+        <p:txBody>
+          <a:bodyPr/>
+          <a:lstStyle/>
+          <a:p>
+            <a:endParaRPr lang="es-MX"/>
+          </a:p>
+        </p:txBody>
+      </p:sp>
+      <p:sp>
+        <p:nvSpPr>
+          <p:cNvPr id="3" name="Content Placeholder 2">
+            <a:extLst>
+              <a:ext uri="{FF2B5EF4-FFF2-40B4-BE49-F238E27FC236}">
+                <a16:creationId xmlns:a16="http://schemas.microsoft.com/office/drawing/2014/main" id="{6C04372B-793F-AA65-5443-85DB30D0DFE7}"/>
+              </a:ext>
+            </a:extLst>
+          </p:cNvPr>
+          <p:cNvSpPr>
+            <a:spLocks noGrp="1"/>
+          </p:cNvSpPr>
+          <p:nvPr>
+            <p:ph idx="1"/>
+          </p:nvPr>
+        </p:nvSpPr>
+        <p:spPr/>
         <p:txBody>
           <a:bodyPr>
             <a:normAutofit/>
@@ -3388,17 +3409,180 @@
           <a:lstStyle/>
           <a:p>
             <a:r>
-              <a:rPr lang="en-US" sz="8800" dirty="0" err="1"/>
-              <a:t>Filtros</a:t>
-            </a:r>
-            <a:endParaRPr lang="es-MX" sz="8800" dirty="0"/>
+              <a:rPr lang="es-MX" sz="1800" dirty="0"/>
+              <a:t>Circuitos de prueba 2 </a:t>
+            </a:r>
+            <a:r>
+              <a:rPr lang="es-MX" sz="1800" dirty="0" err="1"/>
+              <a:t>puertos:Guardar</a:t>
+            </a:r>
+            <a:r>
+              <a:rPr lang="es-MX" sz="1800" dirty="0"/>
+              <a:t> en folders individuales (contenidos en el directorio circuitos de prueba) los siguientes archivos y </a:t>
+            </a:r>
+            <a:r>
+              <a:rPr lang="es-MX" sz="1800" dirty="0" err="1"/>
+              <a:t>docs</a:t>
+            </a:r>
+            <a:r>
+              <a:rPr lang="es-MX" sz="1800" dirty="0"/>
+              <a:t> de los circuitos listados abajo:</a:t>
+            </a:r>
+          </a:p>
+          <a:p>
+            <a:r>
+              <a:rPr lang="es-MX" sz="1800" dirty="0"/>
+              <a:t>*</a:t>
+            </a:r>
+            <a:r>
+              <a:rPr lang="es-MX" sz="1800" dirty="0" err="1"/>
+              <a:t>netlist</a:t>
+            </a:r>
+            <a:r>
+              <a:rPr lang="es-MX" sz="1800" dirty="0"/>
+              <a:t> </a:t>
+            </a:r>
+            <a:r>
+              <a:rPr lang="es-MX" sz="1800" dirty="0" err="1"/>
+              <a:t>.net</a:t>
+            </a:r>
+            <a:endParaRPr lang="es-MX" sz="1800" dirty="0"/>
+          </a:p>
+          <a:p>
+            <a:r>
+              <a:rPr lang="es-MX" sz="1800" dirty="0"/>
+              <a:t>*</a:t>
+            </a:r>
+            <a:r>
+              <a:rPr lang="es-MX" sz="1800" dirty="0" err="1"/>
+              <a:t>netlist</a:t>
+            </a:r>
+            <a:r>
+              <a:rPr lang="es-MX" sz="1800" dirty="0"/>
+              <a:t> .xlsx (</a:t>
+            </a:r>
+            <a:r>
+              <a:rPr lang="es-MX" sz="1800" dirty="0" err="1"/>
+              <a:t>excell</a:t>
+            </a:r>
+            <a:r>
+              <a:rPr lang="es-MX" sz="1800" dirty="0"/>
+              <a:t>)</a:t>
+            </a:r>
+          </a:p>
+          <a:p>
+            <a:r>
+              <a:rPr lang="es-MX" sz="1800" dirty="0"/>
+              <a:t>*Archivo de ADS*Archivo </a:t>
+            </a:r>
+            <a:r>
+              <a:rPr lang="es-MX" sz="1800" dirty="0" err="1"/>
+              <a:t>touchstone</a:t>
+            </a:r>
+            <a:endParaRPr lang="es-MX" sz="1800" dirty="0"/>
+          </a:p>
+          <a:p>
+            <a:r>
+              <a:rPr lang="es-MX" sz="1800" dirty="0"/>
+              <a:t>*Imagen de graficas de </a:t>
+            </a:r>
+            <a:r>
+              <a:rPr lang="es-MX" sz="1800" dirty="0" err="1"/>
+              <a:t>parametros</a:t>
+            </a:r>
+            <a:r>
+              <a:rPr lang="es-MX" sz="1800" dirty="0"/>
+              <a:t> S11 a S22 en rectangular (real-</a:t>
+            </a:r>
+            <a:r>
+              <a:rPr lang="es-MX" sz="1800" dirty="0" err="1"/>
+              <a:t>img</a:t>
+            </a:r>
+            <a:r>
+              <a:rPr lang="es-MX" sz="1800" dirty="0"/>
+              <a:t> y </a:t>
+            </a:r>
+            <a:r>
+              <a:rPr lang="es-MX" sz="1800" dirty="0" err="1"/>
+              <a:t>Mag</a:t>
+            </a:r>
+            <a:r>
+              <a:rPr lang="es-MX" sz="1800" dirty="0"/>
+              <a:t>-fase, vs frecuencia) (graficas separadas para cada </a:t>
+            </a:r>
+            <a:r>
+              <a:rPr lang="es-MX" sz="1800" dirty="0" err="1"/>
+              <a:t>parametro</a:t>
+            </a:r>
+            <a:r>
+              <a:rPr lang="es-MX" sz="1800" dirty="0"/>
+              <a:t>, 1 sola imagen con las 4 graficas) </a:t>
+            </a:r>
+          </a:p>
+          <a:p>
+            <a:r>
+              <a:rPr lang="es-MX" sz="1800" dirty="0"/>
+              <a:t>*Imagen de graficas de </a:t>
+            </a:r>
+            <a:r>
+              <a:rPr lang="es-MX" sz="1800" dirty="0" err="1"/>
+              <a:t>parametros</a:t>
+            </a:r>
+            <a:r>
+              <a:rPr lang="es-MX" sz="1800" dirty="0"/>
+              <a:t> S11 a S22 en Polar (graficas separadas para cada </a:t>
+            </a:r>
+            <a:r>
+              <a:rPr lang="es-MX" sz="1800" dirty="0" err="1"/>
+              <a:t>parametro</a:t>
+            </a:r>
+            <a:r>
+              <a:rPr lang="es-MX" sz="1800" dirty="0"/>
+              <a:t>, 1 sola imagen con las 4 graficas)</a:t>
+            </a:r>
+          </a:p>
+          <a:p>
+            <a:r>
+              <a:rPr lang="es-MX" sz="1800" dirty="0"/>
+              <a:t>*Imagen de graficas de </a:t>
+            </a:r>
+            <a:r>
+              <a:rPr lang="es-MX" sz="1800" dirty="0" err="1"/>
+              <a:t>parametros</a:t>
+            </a:r>
+            <a:r>
+              <a:rPr lang="es-MX" sz="1800" dirty="0"/>
+              <a:t> S11 a S22 en carta Smith (graficas separadas para cada </a:t>
+            </a:r>
+            <a:r>
+              <a:rPr lang="es-MX" sz="1800" dirty="0" err="1"/>
+              <a:t>parametro</a:t>
+            </a:r>
+            <a:r>
+              <a:rPr lang="es-MX" sz="1800" dirty="0"/>
+              <a:t>, 1 sola imagen con las 4 graficas)</a:t>
+            </a:r>
+          </a:p>
+          <a:p>
+            <a:r>
+              <a:rPr lang="es-MX" sz="1800" dirty="0"/>
+              <a:t>*</a:t>
+            </a:r>
+            <a:r>
+              <a:rPr lang="es-MX" sz="1800" dirty="0" err="1"/>
+              <a:t>freq</a:t>
+            </a:r>
+            <a:r>
+              <a:rPr lang="es-MX" sz="1800" dirty="0"/>
+              <a:t> inicio, final,  step y Z0.</a:t>
+            </a:r>
           </a:p>
         </p:txBody>
       </p:sp>
     </p:spTree>
     <p:extLst>
       <p:ext uri="{BB962C8B-B14F-4D97-AF65-F5344CB8AC3E}">
-        <p14:creationId xmlns:p14="http://schemas.microsoft.com/office/powerpoint/2010/main" val="2320359333"/>
+        <p14:creationId xmlns:p14="http://schemas.microsoft.com/office/powerpoint/2010/main" val="2038906558"/>
       </p:ext>
     </p:extLst>
   </p:cSld>
@@ -3409,6 +3593,219 @@
 </file>
 
 <file path=ppt/slides/slide10.xml><?xml version="1.0" encoding="utf-8"?>
+<p:sld xmlns:a="http://schemas.openxmlformats.org/drawingml/2006/main" xmlns:r="http://schemas.openxmlformats.org/officeDocument/2006/relationships" xmlns:p="http://schemas.openxmlformats.org/presentationml/2006/main">
+  <p:cSld>
+    <p:spTree>
+      <p:nvGrpSpPr>
+        <p:cNvPr id="1" name=""/>
+        <p:cNvGrpSpPr/>
+        <p:nvPr/>
+      </p:nvGrpSpPr>
+      <p:grpSpPr>
+        <a:xfrm>
+          <a:off x="0" y="0"/>
+          <a:ext cx="0" cy="0"/>
+          <a:chOff x="0" y="0"/>
+          <a:chExt cx="0" cy="0"/>
+        </a:xfrm>
+      </p:grpSpPr>
+      <p:pic>
+        <p:nvPicPr>
+          <p:cNvPr id="7" name="Picture 6">
+            <a:extLst>
+              <a:ext uri="{FF2B5EF4-FFF2-40B4-BE49-F238E27FC236}">
+                <a16:creationId xmlns:a16="http://schemas.microsoft.com/office/drawing/2014/main" id="{DE0AD59D-133A-A71C-3000-D3D0ABA21B8E}"/>
+              </a:ext>
+            </a:extLst>
+          </p:cNvPr>
+          <p:cNvPicPr>
+            <a:picLocks noChangeAspect="1"/>
+          </p:cNvPicPr>
+          <p:nvPr/>
+        </p:nvPicPr>
+        <p:blipFill>
+          <a:blip r:embed="rId2"/>
+          <a:stretch>
+            <a:fillRect/>
+          </a:stretch>
+        </p:blipFill>
+        <p:spPr>
+          <a:xfrm>
+            <a:off x="381753" y="152694"/>
+            <a:ext cx="5329361" cy="2693142"/>
+          </a:xfrm>
+          <a:prstGeom prst="rect">
+            <a:avLst/>
+          </a:prstGeom>
+        </p:spPr>
+      </p:pic>
+      <p:pic>
+        <p:nvPicPr>
+          <p:cNvPr id="9" name="Picture 8">
+            <a:extLst>
+              <a:ext uri="{FF2B5EF4-FFF2-40B4-BE49-F238E27FC236}">
+                <a16:creationId xmlns:a16="http://schemas.microsoft.com/office/drawing/2014/main" id="{D71421E6-00EF-A6C3-DE9A-61CC0116FB72}"/>
+              </a:ext>
+            </a:extLst>
+          </p:cNvPr>
+          <p:cNvPicPr>
+            <a:picLocks noChangeAspect="1"/>
+          </p:cNvPicPr>
+          <p:nvPr/>
+        </p:nvPicPr>
+        <p:blipFill>
+          <a:blip r:embed="rId3"/>
+          <a:stretch>
+            <a:fillRect/>
+          </a:stretch>
+        </p:blipFill>
+        <p:spPr>
+          <a:xfrm>
+            <a:off x="381753" y="3197274"/>
+            <a:ext cx="5919440" cy="3168441"/>
+          </a:xfrm>
+          <a:prstGeom prst="rect">
+            <a:avLst/>
+          </a:prstGeom>
+        </p:spPr>
+      </p:pic>
+      <p:pic>
+        <p:nvPicPr>
+          <p:cNvPr id="11" name="Picture 10">
+            <a:extLst>
+              <a:ext uri="{FF2B5EF4-FFF2-40B4-BE49-F238E27FC236}">
+                <a16:creationId xmlns:a16="http://schemas.microsoft.com/office/drawing/2014/main" id="{CBAAFA21-9AFE-B0CE-8D55-17DDC8AD3445}"/>
+              </a:ext>
+            </a:extLst>
+          </p:cNvPr>
+          <p:cNvPicPr>
+            <a:picLocks noChangeAspect="1"/>
+          </p:cNvPicPr>
+          <p:nvPr/>
+        </p:nvPicPr>
+        <p:blipFill>
+          <a:blip r:embed="rId4"/>
+          <a:stretch>
+            <a:fillRect/>
+          </a:stretch>
+        </p:blipFill>
+        <p:spPr>
+          <a:xfrm>
+            <a:off x="6194308" y="3289905"/>
+            <a:ext cx="6026640" cy="3075809"/>
+          </a:xfrm>
+          <a:prstGeom prst="rect">
+            <a:avLst/>
+          </a:prstGeom>
+        </p:spPr>
+      </p:pic>
+      <p:pic>
+        <p:nvPicPr>
+          <p:cNvPr id="13" name="Picture 12">
+            <a:extLst>
+              <a:ext uri="{FF2B5EF4-FFF2-40B4-BE49-F238E27FC236}">
+                <a16:creationId xmlns:a16="http://schemas.microsoft.com/office/drawing/2014/main" id="{ECB22A07-E386-0DB6-8EE5-D269D5A93503}"/>
+              </a:ext>
+            </a:extLst>
+          </p:cNvPr>
+          <p:cNvPicPr>
+            <a:picLocks noChangeAspect="1"/>
+          </p:cNvPicPr>
+          <p:nvPr/>
+        </p:nvPicPr>
+        <p:blipFill>
+          <a:blip r:embed="rId5"/>
+          <a:stretch>
+            <a:fillRect/>
+          </a:stretch>
+        </p:blipFill>
+        <p:spPr>
+          <a:xfrm>
+            <a:off x="6301193" y="439092"/>
+            <a:ext cx="5669011" cy="2582463"/>
+          </a:xfrm>
+          <a:prstGeom prst="rect">
+            <a:avLst/>
+          </a:prstGeom>
+        </p:spPr>
+      </p:pic>
+      <p:graphicFrame>
+        <p:nvGraphicFramePr>
+          <p:cNvPr id="14" name="Object 13">
+            <a:extLst>
+              <a:ext uri="{FF2B5EF4-FFF2-40B4-BE49-F238E27FC236}">
+                <a16:creationId xmlns:a16="http://schemas.microsoft.com/office/drawing/2014/main" id="{E6CCEA29-8875-F161-4C4E-3238E911DE04}"/>
+              </a:ext>
+            </a:extLst>
+          </p:cNvPr>
+          <p:cNvGraphicFramePr>
+            <a:graphicFrameLocks noChangeAspect="1"/>
+          </p:cNvGraphicFramePr>
+          <p:nvPr>
+            <p:extLst>
+              <p:ext uri="{D42A27DB-BD31-4B8C-83A1-F6EECF244321}">
+                <p14:modId xmlns:p14="http://schemas.microsoft.com/office/powerpoint/2010/main" val="2252466197"/>
+              </p:ext>
+            </p:extLst>
+          </p:nvPr>
+        </p:nvGraphicFramePr>
+        <p:xfrm>
+          <a:off x="9901140" y="453087"/>
+          <a:ext cx="1998663" cy="439737"/>
+        </p:xfrm>
+        <a:graphic>
+          <a:graphicData uri="http://schemas.openxmlformats.org/presentationml/2006/ole">
+            <mc:AlternateContent xmlns:mc="http://schemas.openxmlformats.org/markup-compatibility/2006">
+              <mc:Choice xmlns:v="urn:schemas-microsoft-com:vml" Requires="v">
+                <p:oleObj name="Packager Shell Object" showAsIcon="1" r:id="rId6" imgW="1999440" imgH="439560" progId="Package">
+                  <p:embed/>
+                </p:oleObj>
+              </mc:Choice>
+              <mc:Fallback>
+                <p:oleObj name="Packager Shell Object" showAsIcon="1" r:id="rId6" imgW="1999440" imgH="439560" progId="Package">
+                  <p:embed/>
+                  <p:pic>
+                    <p:nvPicPr>
+                      <p:cNvPr id="0" name=""/>
+                      <p:cNvPicPr/>
+                      <p:nvPr/>
+                    </p:nvPicPr>
+                    <p:blipFill>
+                      <a:blip r:embed="rId7"/>
+                      <a:stretch>
+                        <a:fillRect/>
+                      </a:stretch>
+                    </p:blipFill>
+                    <p:spPr>
+                      <a:xfrm>
+                        <a:off x="9901140" y="453087"/>
+                        <a:ext cx="1998663" cy="439737"/>
+                      </a:xfrm>
+                      <a:prstGeom prst="rect">
+                        <a:avLst/>
+                      </a:prstGeom>
+                    </p:spPr>
+                  </p:pic>
+                </p:oleObj>
+              </mc:Fallback>
+            </mc:AlternateContent>
+          </a:graphicData>
+        </a:graphic>
+      </p:graphicFrame>
+    </p:spTree>
+    <p:extLst>
+      <p:ext uri="{BB962C8B-B14F-4D97-AF65-F5344CB8AC3E}">
+        <p14:creationId xmlns:p14="http://schemas.microsoft.com/office/powerpoint/2010/main" val="1306867114"/>
+      </p:ext>
+    </p:extLst>
+  </p:cSld>
+  <p:clrMapOvr>
+    <a:masterClrMapping/>
+  </p:clrMapOvr>
+</p:sld>
+</file>
+
+<file path=ppt/slides/slide11.xml><?xml version="1.0" encoding="utf-8"?>
 <p:sld xmlns:a="http://schemas.openxmlformats.org/drawingml/2006/main" xmlns:r="http://schemas.openxmlformats.org/officeDocument/2006/relationships" xmlns:p="http://schemas.openxmlformats.org/presentationml/2006/main">
   <p:cSld>
     <p:spTree>
@@ -3587,7 +3984,7 @@
 </p:sld>
 </file>
 
-<file path=ppt/slides/slide11.xml><?xml version="1.0" encoding="utf-8"?>
+<file path=ppt/slides/slide12.xml><?xml version="1.0" encoding="utf-8"?>
 <p:sld xmlns:a="http://schemas.openxmlformats.org/drawingml/2006/main" xmlns:r="http://schemas.openxmlformats.org/officeDocument/2006/relationships" xmlns:p="http://schemas.openxmlformats.org/presentationml/2006/main">
   <p:cSld>
     <p:spTree>
@@ -3766,7 +4163,7 @@
 </p:sld>
 </file>
 
-<file path=ppt/slides/slide12.xml><?xml version="1.0" encoding="utf-8"?>
+<file path=ppt/slides/slide13.xml><?xml version="1.0" encoding="utf-8"?>
 <p:sld xmlns:a="http://schemas.openxmlformats.org/drawingml/2006/main" xmlns:r="http://schemas.openxmlformats.org/officeDocument/2006/relationships" xmlns:p="http://schemas.openxmlformats.org/presentationml/2006/main">
   <p:cSld>
     <p:spTree>
@@ -3945,7 +4342,7 @@
 </p:sld>
 </file>
 
-<file path=ppt/slides/slide13.xml><?xml version="1.0" encoding="utf-8"?>
+<file path=ppt/slides/slide14.xml><?xml version="1.0" encoding="utf-8"?>
 <p:sld xmlns:a="http://schemas.openxmlformats.org/drawingml/2006/main" xmlns:r="http://schemas.openxmlformats.org/officeDocument/2006/relationships" xmlns:p="http://schemas.openxmlformats.org/presentationml/2006/main">
   <p:cSld>
     <p:spTree>
@@ -4102,6 +4499,72 @@
           <a:chExt cx="0" cy="0"/>
         </a:xfrm>
       </p:grpSpPr>
+      <p:sp>
+        <p:nvSpPr>
+          <p:cNvPr id="2" name="Title 1">
+            <a:extLst>
+              <a:ext uri="{FF2B5EF4-FFF2-40B4-BE49-F238E27FC236}">
+                <a16:creationId xmlns:a16="http://schemas.microsoft.com/office/drawing/2014/main" id="{19D7FB23-EDF7-D84B-97F8-0E6D5706DC2F}"/>
+              </a:ext>
+            </a:extLst>
+          </p:cNvPr>
+          <p:cNvSpPr>
+            <a:spLocks noGrp="1"/>
+          </p:cNvSpPr>
+          <p:nvPr>
+            <p:ph type="title"/>
+          </p:nvPr>
+        </p:nvSpPr>
+        <p:spPr>
+          <a:xfrm>
+            <a:off x="3777343" y="2371207"/>
+            <a:ext cx="10515600" cy="1325563"/>
+          </a:xfrm>
+        </p:spPr>
+        <p:txBody>
+          <a:bodyPr>
+            <a:normAutofit/>
+          </a:bodyPr>
+          <a:lstStyle/>
+          <a:p>
+            <a:r>
+              <a:rPr lang="en-US" sz="8800" dirty="0" err="1"/>
+              <a:t>Filtros</a:t>
+            </a:r>
+            <a:endParaRPr lang="es-MX" sz="8800" dirty="0"/>
+          </a:p>
+        </p:txBody>
+      </p:sp>
+    </p:spTree>
+    <p:extLst>
+      <p:ext uri="{BB962C8B-B14F-4D97-AF65-F5344CB8AC3E}">
+        <p14:creationId xmlns:p14="http://schemas.microsoft.com/office/powerpoint/2010/main" val="2320359333"/>
+      </p:ext>
+    </p:extLst>
+  </p:cSld>
+  <p:clrMapOvr>
+    <a:masterClrMapping/>
+  </p:clrMapOvr>
+</p:sld>
+</file>
+
+<file path=ppt/slides/slide3.xml><?xml version="1.0" encoding="utf-8"?>
+<p:sld xmlns:a="http://schemas.openxmlformats.org/drawingml/2006/main" xmlns:r="http://schemas.openxmlformats.org/officeDocument/2006/relationships" xmlns:p="http://schemas.openxmlformats.org/presentationml/2006/main">
+  <p:cSld>
+    <p:spTree>
+      <p:nvGrpSpPr>
+        <p:cNvPr id="1" name=""/>
+        <p:cNvGrpSpPr/>
+        <p:nvPr/>
+      </p:nvGrpSpPr>
+      <p:grpSpPr>
+        <a:xfrm>
+          <a:off x="0" y="0"/>
+          <a:ext cx="0" cy="0"/>
+          <a:chOff x="0" y="0"/>
+          <a:chExt cx="0" cy="0"/>
+        </a:xfrm>
+      </p:grpSpPr>
       <p:pic>
         <p:nvPicPr>
           <p:cNvPr id="5" name="Picture 4">
@@ -4303,7 +4766,7 @@
 </p:sld>
 </file>
 
-<file path=ppt/slides/slide3.xml><?xml version="1.0" encoding="utf-8"?>
+<file path=ppt/slides/slide4.xml><?xml version="1.0" encoding="utf-8"?>
 <p:sld xmlns:a="http://schemas.openxmlformats.org/drawingml/2006/main" xmlns:r="http://schemas.openxmlformats.org/officeDocument/2006/relationships" xmlns:p="http://schemas.openxmlformats.org/presentationml/2006/main">
   <p:cSld>
     <p:spTree>
@@ -4585,7 +5048,7 @@
 </p:sld>
 </file>
 
-<file path=ppt/slides/slide4.xml><?xml version="1.0" encoding="utf-8"?>
+<file path=ppt/slides/slide5.xml><?xml version="1.0" encoding="utf-8"?>
 <p:sld xmlns:a="http://schemas.openxmlformats.org/drawingml/2006/main" xmlns:r="http://schemas.openxmlformats.org/officeDocument/2006/relationships" xmlns:p="http://schemas.openxmlformats.org/presentationml/2006/main">
   <p:cSld>
     <p:spTree>
@@ -4842,7 +5305,7 @@
 </p:sld>
 </file>
 
-<file path=ppt/slides/slide5.xml><?xml version="1.0" encoding="utf-8"?>
+<file path=ppt/slides/slide6.xml><?xml version="1.0" encoding="utf-8"?>
 <p:sld xmlns:a="http://schemas.openxmlformats.org/drawingml/2006/main" xmlns:r="http://schemas.openxmlformats.org/officeDocument/2006/relationships" xmlns:p="http://schemas.openxmlformats.org/presentationml/2006/main">
   <p:cSld>
     <p:spTree>
@@ -5038,7 +5501,7 @@
 </p:sld>
 </file>
 
-<file path=ppt/slides/slide6.xml><?xml version="1.0" encoding="utf-8"?>
+<file path=ppt/slides/slide7.xml><?xml version="1.0" encoding="utf-8"?>
 <p:sld xmlns:a="http://schemas.openxmlformats.org/drawingml/2006/main" xmlns:r="http://schemas.openxmlformats.org/officeDocument/2006/relationships" xmlns:p="http://schemas.openxmlformats.org/presentationml/2006/main">
   <p:cSld>
     <p:spTree>
@@ -5357,7 +5820,7 @@
 </p:sld>
 </file>
 
-<file path=ppt/slides/slide7.xml><?xml version="1.0" encoding="utf-8"?>
+<file path=ppt/slides/slide8.xml><?xml version="1.0" encoding="utf-8"?>
 <p:sld xmlns:a="http://schemas.openxmlformats.org/drawingml/2006/main" xmlns:r="http://schemas.openxmlformats.org/officeDocument/2006/relationships" xmlns:p="http://schemas.openxmlformats.org/presentationml/2006/main">
   <p:cSld>
     <p:spTree>
@@ -5564,76 +6027,6 @@
 </p:sld>
 </file>
 
-<file path=ppt/slides/slide8.xml><?xml version="1.0" encoding="utf-8"?>
-<p:sld xmlns:a="http://schemas.openxmlformats.org/drawingml/2006/main" xmlns:r="http://schemas.openxmlformats.org/officeDocument/2006/relationships" xmlns:p="http://schemas.openxmlformats.org/presentationml/2006/main">
-  <p:cSld>
-    <p:spTree>
-      <p:nvGrpSpPr>
-        <p:cNvPr id="1" name=""/>
-        <p:cNvGrpSpPr/>
-        <p:nvPr/>
-      </p:nvGrpSpPr>
-      <p:grpSpPr>
-        <a:xfrm>
-          <a:off x="0" y="0"/>
-          <a:ext cx="0" cy="0"/>
-          <a:chOff x="0" y="0"/>
-          <a:chExt cx="0" cy="0"/>
-        </a:xfrm>
-      </p:grpSpPr>
-      <p:sp>
-        <p:nvSpPr>
-          <p:cNvPr id="2" name="Title 1">
-            <a:extLst>
-              <a:ext uri="{FF2B5EF4-FFF2-40B4-BE49-F238E27FC236}">
-                <a16:creationId xmlns:a16="http://schemas.microsoft.com/office/drawing/2014/main" id="{19D7FB23-EDF7-D84B-97F8-0E6D5706DC2F}"/>
-              </a:ext>
-            </a:extLst>
-          </p:cNvPr>
-          <p:cNvSpPr>
-            <a:spLocks noGrp="1"/>
-          </p:cNvSpPr>
-          <p:nvPr>
-            <p:ph type="title"/>
-          </p:nvPr>
-        </p:nvSpPr>
-        <p:spPr>
-          <a:xfrm>
-            <a:off x="2806959" y="2408529"/>
-            <a:ext cx="10515600" cy="1325563"/>
-          </a:xfrm>
-        </p:spPr>
-        <p:txBody>
-          <a:bodyPr>
-            <a:normAutofit/>
-          </a:bodyPr>
-          <a:lstStyle/>
-          <a:p>
-            <a:r>
-              <a:rPr lang="en-US" sz="8800" dirty="0" err="1"/>
-              <a:t>Circuitos</a:t>
-            </a:r>
-            <a:r>
-              <a:rPr lang="en-US" sz="8800" dirty="0"/>
-              <a:t> extras</a:t>
-            </a:r>
-            <a:endParaRPr lang="es-MX" sz="8800" dirty="0"/>
-          </a:p>
-        </p:txBody>
-      </p:sp>
-    </p:spTree>
-    <p:extLst>
-      <p:ext uri="{BB962C8B-B14F-4D97-AF65-F5344CB8AC3E}">
-        <p14:creationId xmlns:p14="http://schemas.microsoft.com/office/powerpoint/2010/main" val="2063640626"/>
-      </p:ext>
-    </p:extLst>
-  </p:cSld>
-  <p:clrMapOvr>
-    <a:masterClrMapping/>
-  </p:clrMapOvr>
-</p:sld>
-</file>
-
 <file path=ppt/slides/slide9.xml><?xml version="1.0" encoding="utf-8"?>
 <p:sld xmlns:a="http://schemas.openxmlformats.org/drawingml/2006/main" xmlns:r="http://schemas.openxmlformats.org/officeDocument/2006/relationships" xmlns:p="http://schemas.openxmlformats.org/presentationml/2006/main">
   <p:cSld>
@@ -5651,193 +6044,50 @@
           <a:chExt cx="0" cy="0"/>
         </a:xfrm>
       </p:grpSpPr>
-      <p:pic>
-        <p:nvPicPr>
-          <p:cNvPr id="7" name="Picture 6">
-            <a:extLst>
-              <a:ext uri="{FF2B5EF4-FFF2-40B4-BE49-F238E27FC236}">
-                <a16:creationId xmlns:a16="http://schemas.microsoft.com/office/drawing/2014/main" id="{DE0AD59D-133A-A71C-3000-D3D0ABA21B8E}"/>
-              </a:ext>
-            </a:extLst>
-          </p:cNvPr>
-          <p:cNvPicPr>
-            <a:picLocks noChangeAspect="1"/>
-          </p:cNvPicPr>
-          <p:nvPr/>
-        </p:nvPicPr>
-        <p:blipFill>
-          <a:blip r:embed="rId2"/>
-          <a:stretch>
-            <a:fillRect/>
-          </a:stretch>
-        </p:blipFill>
+      <p:sp>
+        <p:nvSpPr>
+          <p:cNvPr id="2" name="Title 1">
+            <a:extLst>
+              <a:ext uri="{FF2B5EF4-FFF2-40B4-BE49-F238E27FC236}">
+                <a16:creationId xmlns:a16="http://schemas.microsoft.com/office/drawing/2014/main" id="{19D7FB23-EDF7-D84B-97F8-0E6D5706DC2F}"/>
+              </a:ext>
+            </a:extLst>
+          </p:cNvPr>
+          <p:cNvSpPr>
+            <a:spLocks noGrp="1"/>
+          </p:cNvSpPr>
+          <p:nvPr>
+            <p:ph type="title"/>
+          </p:nvPr>
+        </p:nvSpPr>
         <p:spPr>
           <a:xfrm>
-            <a:off x="381753" y="152694"/>
-            <a:ext cx="5329361" cy="2693142"/>
+            <a:off x="2806959" y="2408529"/>
+            <a:ext cx="10515600" cy="1325563"/>
           </a:xfrm>
-          <a:prstGeom prst="rect">
-            <a:avLst/>
-          </a:prstGeom>
         </p:spPr>
-      </p:pic>
-      <p:pic>
-        <p:nvPicPr>
-          <p:cNvPr id="9" name="Picture 8">
-            <a:extLst>
-              <a:ext uri="{FF2B5EF4-FFF2-40B4-BE49-F238E27FC236}">
-                <a16:creationId xmlns:a16="http://schemas.microsoft.com/office/drawing/2014/main" id="{D71421E6-00EF-A6C3-DE9A-61CC0116FB72}"/>
-              </a:ext>
-            </a:extLst>
-          </p:cNvPr>
-          <p:cNvPicPr>
-            <a:picLocks noChangeAspect="1"/>
-          </p:cNvPicPr>
-          <p:nvPr/>
-        </p:nvPicPr>
-        <p:blipFill>
-          <a:blip r:embed="rId3"/>
-          <a:stretch>
-            <a:fillRect/>
-          </a:stretch>
-        </p:blipFill>
-        <p:spPr>
-          <a:xfrm>
-            <a:off x="381753" y="3197274"/>
-            <a:ext cx="5919440" cy="3168441"/>
-          </a:xfrm>
-          <a:prstGeom prst="rect">
-            <a:avLst/>
-          </a:prstGeom>
-        </p:spPr>
-      </p:pic>
-      <p:pic>
-        <p:nvPicPr>
-          <p:cNvPr id="11" name="Picture 10">
-            <a:extLst>
-              <a:ext uri="{FF2B5EF4-FFF2-40B4-BE49-F238E27FC236}">
-                <a16:creationId xmlns:a16="http://schemas.microsoft.com/office/drawing/2014/main" id="{CBAAFA21-9AFE-B0CE-8D55-17DDC8AD3445}"/>
-              </a:ext>
-            </a:extLst>
-          </p:cNvPr>
-          <p:cNvPicPr>
-            <a:picLocks noChangeAspect="1"/>
-          </p:cNvPicPr>
-          <p:nvPr/>
-        </p:nvPicPr>
-        <p:blipFill>
-          <a:blip r:embed="rId4"/>
-          <a:stretch>
-            <a:fillRect/>
-          </a:stretch>
-        </p:blipFill>
-        <p:spPr>
-          <a:xfrm>
-            <a:off x="6194308" y="3289905"/>
-            <a:ext cx="6026640" cy="3075809"/>
-          </a:xfrm>
-          <a:prstGeom prst="rect">
-            <a:avLst/>
-          </a:prstGeom>
-        </p:spPr>
-      </p:pic>
-      <p:pic>
-        <p:nvPicPr>
-          <p:cNvPr id="13" name="Picture 12">
-            <a:extLst>
-              <a:ext uri="{FF2B5EF4-FFF2-40B4-BE49-F238E27FC236}">
-                <a16:creationId xmlns:a16="http://schemas.microsoft.com/office/drawing/2014/main" id="{ECB22A07-E386-0DB6-8EE5-D269D5A93503}"/>
-              </a:ext>
-            </a:extLst>
-          </p:cNvPr>
-          <p:cNvPicPr>
-            <a:picLocks noChangeAspect="1"/>
-          </p:cNvPicPr>
-          <p:nvPr/>
-        </p:nvPicPr>
-        <p:blipFill>
-          <a:blip r:embed="rId5"/>
-          <a:stretch>
-            <a:fillRect/>
-          </a:stretch>
-        </p:blipFill>
-        <p:spPr>
-          <a:xfrm>
-            <a:off x="6301193" y="439092"/>
-            <a:ext cx="5669011" cy="2582463"/>
-          </a:xfrm>
-          <a:prstGeom prst="rect">
-            <a:avLst/>
-          </a:prstGeom>
-        </p:spPr>
-      </p:pic>
-      <p:graphicFrame>
-        <p:nvGraphicFramePr>
-          <p:cNvPr id="14" name="Object 13">
-            <a:extLst>
-              <a:ext uri="{FF2B5EF4-FFF2-40B4-BE49-F238E27FC236}">
-                <a16:creationId xmlns:a16="http://schemas.microsoft.com/office/drawing/2014/main" id="{E6CCEA29-8875-F161-4C4E-3238E911DE04}"/>
-              </a:ext>
-            </a:extLst>
-          </p:cNvPr>
-          <p:cNvGraphicFramePr>
-            <a:graphicFrameLocks noChangeAspect="1"/>
-          </p:cNvGraphicFramePr>
-          <p:nvPr>
-            <p:extLst>
-              <p:ext uri="{D42A27DB-BD31-4B8C-83A1-F6EECF244321}">
-                <p14:modId xmlns:p14="http://schemas.microsoft.com/office/powerpoint/2010/main" val="2252466197"/>
-              </p:ext>
-            </p:extLst>
-          </p:nvPr>
-        </p:nvGraphicFramePr>
-        <p:xfrm>
-          <a:off x="9901140" y="453087"/>
-          <a:ext cx="1998663" cy="439737"/>
-        </p:xfrm>
-        <a:graphic>
-          <a:graphicData uri="http://schemas.openxmlformats.org/presentationml/2006/ole">
-            <mc:AlternateContent xmlns:mc="http://schemas.openxmlformats.org/markup-compatibility/2006">
-              <mc:Choice xmlns:v="urn:schemas-microsoft-com:vml" Requires="v">
-                <p:oleObj name="Packager Shell Object" showAsIcon="1" r:id="rId6" imgW="1999440" imgH="439560" progId="Package">
-                  <p:embed/>
-                </p:oleObj>
-              </mc:Choice>
-              <mc:Fallback>
-                <p:oleObj name="Packager Shell Object" showAsIcon="1" r:id="rId6" imgW="1999440" imgH="439560" progId="Package">
-                  <p:embed/>
-                  <p:pic>
-                    <p:nvPicPr>
-                      <p:cNvPr id="0" name=""/>
-                      <p:cNvPicPr/>
-                      <p:nvPr/>
-                    </p:nvPicPr>
-                    <p:blipFill>
-                      <a:blip r:embed="rId7"/>
-                      <a:stretch>
-                        <a:fillRect/>
-                      </a:stretch>
-                    </p:blipFill>
-                    <p:spPr>
-                      <a:xfrm>
-                        <a:off x="9901140" y="453087"/>
-                        <a:ext cx="1998663" cy="439737"/>
-                      </a:xfrm>
-                      <a:prstGeom prst="rect">
-                        <a:avLst/>
-                      </a:prstGeom>
-                    </p:spPr>
-                  </p:pic>
-                </p:oleObj>
-              </mc:Fallback>
-            </mc:AlternateContent>
-          </a:graphicData>
-        </a:graphic>
-      </p:graphicFrame>
+        <p:txBody>
+          <a:bodyPr>
+            <a:normAutofit/>
+          </a:bodyPr>
+          <a:lstStyle/>
+          <a:p>
+            <a:r>
+              <a:rPr lang="en-US" sz="8800" dirty="0" err="1"/>
+              <a:t>Circuitos</a:t>
+            </a:r>
+            <a:r>
+              <a:rPr lang="en-US" sz="8800" dirty="0"/>
+              <a:t> extras</a:t>
+            </a:r>
+            <a:endParaRPr lang="es-MX" sz="8800" dirty="0"/>
+          </a:p>
+        </p:txBody>
+      </p:sp>
     </p:spTree>
     <p:extLst>
       <p:ext uri="{BB962C8B-B14F-4D97-AF65-F5344CB8AC3E}">
-        <p14:creationId xmlns:p14="http://schemas.microsoft.com/office/powerpoint/2010/main" val="1306867114"/>
+        <p14:creationId xmlns:p14="http://schemas.microsoft.com/office/powerpoint/2010/main" val="2063640626"/>
       </p:ext>
     </p:extLst>
   </p:cSld>

</xml_diff>